<commit_message>
Completed all but class grouping section
</commit_message>
<xml_diff>
--- a/extended_abstract/block_diagram.pptx
+++ b/extended_abstract/block_diagram.pptx
@@ -2964,692 +2964,514 @@
           <a:chExt cx="0" cy="0"/>
         </a:xfrm>
       </p:grpSpPr>
+      <p:sp>
+        <p:nvSpPr>
+          <p:cNvPr id="5" name="Rectangle 4"/>
+          <p:cNvSpPr/>
+          <p:nvPr/>
+        </p:nvSpPr>
+        <p:spPr>
+          <a:xfrm>
+            <a:off x="0" y="0"/>
+            <a:ext cx="12192000" cy="6858000"/>
+          </a:xfrm>
+          <a:prstGeom prst="rect">
+            <a:avLst/>
+          </a:prstGeom>
+          <a:solidFill>
+            <a:schemeClr val="accent1">
+              <a:alpha val="20000"/>
+            </a:schemeClr>
+          </a:solidFill>
+        </p:spPr>
+        <p:style>
+          <a:lnRef idx="2">
+            <a:schemeClr val="accent1">
+              <a:shade val="50000"/>
+            </a:schemeClr>
+          </a:lnRef>
+          <a:fillRef idx="1">
+            <a:schemeClr val="accent1"/>
+          </a:fillRef>
+          <a:effectRef idx="0">
+            <a:schemeClr val="accent1"/>
+          </a:effectRef>
+          <a:fontRef idx="minor">
+            <a:schemeClr val="lt1"/>
+          </a:fontRef>
+        </p:style>
+        <p:txBody>
+          <a:bodyPr rtlCol="0" anchor="t"/>
+          <a:lstStyle/>
+          <a:p>
+            <a:r>
+              <a:rPr lang="en-US" sz="3600" u="sng" dirty="0" smtClean="0">
+                <a:solidFill>
+                  <a:schemeClr val="tx1"/>
+                </a:solidFill>
+              </a:rPr>
+              <a:t>Docker Container</a:t>
+            </a:r>
+            <a:endParaRPr lang="en-US" sz="3600" u="sng" dirty="0">
+              <a:solidFill>
+                <a:schemeClr val="tx1"/>
+              </a:solidFill>
+            </a:endParaRPr>
+          </a:p>
+        </p:txBody>
+      </p:sp>
+      <p:sp>
+        <p:nvSpPr>
+          <p:cNvPr id="30" name="Rectangle 29"/>
+          <p:cNvSpPr/>
+          <p:nvPr/>
+        </p:nvSpPr>
+        <p:spPr>
+          <a:xfrm>
+            <a:off x="2340311" y="809031"/>
+            <a:ext cx="9692258" cy="5928651"/>
+          </a:xfrm>
+          <a:prstGeom prst="rect">
+            <a:avLst/>
+          </a:prstGeom>
+          <a:solidFill>
+            <a:schemeClr val="accent2">
+              <a:alpha val="50000"/>
+            </a:schemeClr>
+          </a:solidFill>
+        </p:spPr>
+        <p:style>
+          <a:lnRef idx="2">
+            <a:schemeClr val="accent1">
+              <a:shade val="50000"/>
+            </a:schemeClr>
+          </a:lnRef>
+          <a:fillRef idx="1">
+            <a:schemeClr val="accent1"/>
+          </a:fillRef>
+          <a:effectRef idx="0">
+            <a:schemeClr val="accent1"/>
+          </a:effectRef>
+          <a:fontRef idx="minor">
+            <a:schemeClr val="lt1"/>
+          </a:fontRef>
+        </p:style>
+        <p:txBody>
+          <a:bodyPr rtlCol="0" anchor="t"/>
+          <a:lstStyle/>
+          <a:p>
+            <a:r>
+              <a:rPr lang="en-US" sz="3600" u="sng" dirty="0" smtClean="0">
+                <a:solidFill>
+                  <a:schemeClr val="tx1"/>
+                </a:solidFill>
+              </a:rPr>
+              <a:t>Spark-Based Analytics Platform</a:t>
+            </a:r>
+            <a:endParaRPr lang="en-US" sz="3600" u="sng" dirty="0">
+              <a:solidFill>
+                <a:schemeClr val="tx1"/>
+              </a:solidFill>
+            </a:endParaRPr>
+          </a:p>
+        </p:txBody>
+      </p:sp>
+      <p:sp>
+        <p:nvSpPr>
+          <p:cNvPr id="6" name="Rectangle 5"/>
+          <p:cNvSpPr/>
+          <p:nvPr/>
+        </p:nvSpPr>
+        <p:spPr>
+          <a:xfrm>
+            <a:off x="2431816" y="1450265"/>
+            <a:ext cx="1979926" cy="2060168"/>
+          </a:xfrm>
+          <a:prstGeom prst="rect">
+            <a:avLst/>
+          </a:prstGeom>
+        </p:spPr>
+        <p:style>
+          <a:lnRef idx="2">
+            <a:schemeClr val="accent1">
+              <a:shade val="50000"/>
+            </a:schemeClr>
+          </a:lnRef>
+          <a:fillRef idx="1">
+            <a:schemeClr val="accent1"/>
+          </a:fillRef>
+          <a:effectRef idx="0">
+            <a:schemeClr val="accent1"/>
+          </a:effectRef>
+          <a:fontRef idx="minor">
+            <a:schemeClr val="lt1"/>
+          </a:fontRef>
+        </p:style>
+        <p:txBody>
+          <a:bodyPr rtlCol="0" anchor="t"/>
+          <a:lstStyle/>
+          <a:p>
+            <a:pPr algn="ctr"/>
+            <a:r>
+              <a:rPr lang="en-US" sz="2400" dirty="0" smtClean="0"/>
+              <a:t>Mandatory </a:t>
+            </a:r>
+            <a:br>
+              <a:rPr lang="en-US" sz="2400" dirty="0" smtClean="0"/>
+            </a:br>
+            <a:r>
+              <a:rPr lang="en-US" sz="2400" dirty="0" smtClean="0"/>
+              <a:t>Preprocessing</a:t>
+            </a:r>
+          </a:p>
+          <a:p>
+            <a:pPr marL="330200" indent="-330200">
+              <a:buFont typeface="Arial" charset="0"/>
+              <a:buChar char="•"/>
+            </a:pPr>
+            <a:endParaRPr lang="en-US" sz="2400" dirty="0" smtClean="0"/>
+          </a:p>
+        </p:txBody>
+      </p:sp>
+      <p:sp>
+        <p:nvSpPr>
+          <p:cNvPr id="7" name="Rectangle 6"/>
+          <p:cNvSpPr/>
+          <p:nvPr/>
+        </p:nvSpPr>
+        <p:spPr>
+          <a:xfrm>
+            <a:off x="7881530" y="1510726"/>
+            <a:ext cx="3273939" cy="2309352"/>
+          </a:xfrm>
+          <a:prstGeom prst="rect">
+            <a:avLst/>
+          </a:prstGeom>
+          <a:solidFill>
+            <a:schemeClr val="accent1"/>
+          </a:solidFill>
+          <a:ln>
+            <a:solidFill>
+              <a:schemeClr val="accent6">
+                <a:lumMod val="50000"/>
+              </a:schemeClr>
+            </a:solidFill>
+          </a:ln>
+        </p:spPr>
+        <p:style>
+          <a:lnRef idx="2">
+            <a:schemeClr val="accent1">
+              <a:shade val="50000"/>
+            </a:schemeClr>
+          </a:lnRef>
+          <a:fillRef idx="1">
+            <a:schemeClr val="accent1"/>
+          </a:fillRef>
+          <a:effectRef idx="0">
+            <a:schemeClr val="accent1"/>
+          </a:effectRef>
+          <a:fontRef idx="minor">
+            <a:schemeClr val="lt1"/>
+          </a:fontRef>
+        </p:style>
+        <p:txBody>
+          <a:bodyPr rtlCol="0" anchor="t"/>
+          <a:lstStyle/>
+          <a:p>
+            <a:pPr algn="ctr"/>
+            <a:r>
+              <a:rPr lang="en-US" sz="2800" u="sng" dirty="0" smtClean="0"/>
+              <a:t>Analysis Tools</a:t>
+            </a:r>
+          </a:p>
+          <a:p>
+            <a:pPr marL="457200" indent="-457200">
+              <a:buFont typeface="Arial" charset="0"/>
+              <a:buChar char="•"/>
+            </a:pPr>
+            <a:r>
+              <a:rPr lang="en-US" sz="2800" dirty="0" err="1" smtClean="0"/>
+              <a:t>MLLib</a:t>
+            </a:r>
+            <a:r>
+              <a:rPr lang="en-US" sz="2800" dirty="0" smtClean="0"/>
+              <a:t> Classifiers</a:t>
+            </a:r>
+          </a:p>
+          <a:p>
+            <a:pPr marL="457200" indent="-457200">
+              <a:buFont typeface="Arial" charset="0"/>
+              <a:buChar char="•"/>
+            </a:pPr>
+            <a:r>
+              <a:rPr lang="en-US" sz="2800" dirty="0" smtClean="0"/>
+              <a:t>Custom-built classifiers</a:t>
+            </a:r>
+            <a:endParaRPr lang="en-US" sz="2800" dirty="0" smtClean="0"/>
+          </a:p>
+        </p:txBody>
+      </p:sp>
+      <p:sp>
+        <p:nvSpPr>
+          <p:cNvPr id="8" name="Rectangle 7"/>
+          <p:cNvSpPr/>
+          <p:nvPr/>
+        </p:nvSpPr>
+        <p:spPr>
+          <a:xfrm>
+            <a:off x="7885788" y="4620163"/>
+            <a:ext cx="3265422" cy="1553970"/>
+          </a:xfrm>
+          <a:prstGeom prst="rect">
+            <a:avLst/>
+          </a:prstGeom>
+        </p:spPr>
+        <p:style>
+          <a:lnRef idx="2">
+            <a:schemeClr val="accent1">
+              <a:shade val="50000"/>
+            </a:schemeClr>
+          </a:lnRef>
+          <a:fillRef idx="1">
+            <a:schemeClr val="accent1"/>
+          </a:fillRef>
+          <a:effectRef idx="0">
+            <a:schemeClr val="accent1"/>
+          </a:effectRef>
+          <a:fontRef idx="minor">
+            <a:schemeClr val="lt1"/>
+          </a:fontRef>
+        </p:style>
+        <p:txBody>
+          <a:bodyPr rtlCol="0" anchor="t"/>
+          <a:lstStyle/>
+          <a:p>
+            <a:pPr algn="ctr"/>
+            <a:r>
+              <a:rPr lang="en-US" sz="2800" u="sng" dirty="0" smtClean="0"/>
+              <a:t>Visualization</a:t>
+            </a:r>
+          </a:p>
+          <a:p>
+            <a:pPr marL="457200" indent="-457200">
+              <a:buFont typeface="Arial" charset="0"/>
+              <a:buChar char="•"/>
+            </a:pPr>
+            <a:r>
+              <a:rPr lang="en-US" sz="2800" dirty="0" smtClean="0"/>
+              <a:t>For evaluation</a:t>
+            </a:r>
+            <a:endParaRPr lang="en-US" sz="2800" dirty="0" smtClean="0"/>
+          </a:p>
+        </p:txBody>
+      </p:sp>
+      <p:sp>
+        <p:nvSpPr>
+          <p:cNvPr id="9" name="Snip Single Corner Rectangle 8"/>
+          <p:cNvSpPr/>
+          <p:nvPr/>
+        </p:nvSpPr>
+        <p:spPr>
+          <a:xfrm>
+            <a:off x="4000622" y="4620163"/>
+            <a:ext cx="1717763" cy="1582775"/>
+          </a:xfrm>
+          <a:prstGeom prst="snip1Rect">
+            <a:avLst/>
+          </a:prstGeom>
+          <a:solidFill>
+            <a:schemeClr val="accent6"/>
+          </a:solidFill>
+          <a:ln>
+            <a:solidFill>
+              <a:schemeClr val="accent3">
+                <a:lumMod val="50000"/>
+              </a:schemeClr>
+            </a:solidFill>
+          </a:ln>
+        </p:spPr>
+        <p:style>
+          <a:lnRef idx="2">
+            <a:schemeClr val="accent1">
+              <a:shade val="50000"/>
+            </a:schemeClr>
+          </a:lnRef>
+          <a:fillRef idx="1">
+            <a:schemeClr val="accent1"/>
+          </a:fillRef>
+          <a:effectRef idx="0">
+            <a:schemeClr val="accent1"/>
+          </a:effectRef>
+          <a:fontRef idx="minor">
+            <a:schemeClr val="lt1"/>
+          </a:fontRef>
+        </p:style>
+        <p:txBody>
+          <a:bodyPr rtlCol="0" anchor="ctr"/>
+          <a:lstStyle/>
+          <a:p>
+            <a:pPr algn="ctr"/>
+            <a:r>
+              <a:rPr lang="en-US" sz="2800" dirty="0" smtClean="0"/>
+              <a:t>Targeted Subset of</a:t>
+            </a:r>
+            <a:br>
+              <a:rPr lang="en-US" sz="2800" dirty="0" smtClean="0"/>
+            </a:br>
+            <a:r>
+              <a:rPr lang="en-US" sz="2800" dirty="0" smtClean="0"/>
+              <a:t>Data</a:t>
+            </a:r>
+            <a:endParaRPr lang="en-US" sz="2800" dirty="0"/>
+          </a:p>
+        </p:txBody>
+      </p:sp>
+      <p:sp>
+        <p:nvSpPr>
+          <p:cNvPr id="10" name="Right Arrow 9"/>
+          <p:cNvSpPr/>
+          <p:nvPr/>
+        </p:nvSpPr>
+        <p:spPr>
+          <a:xfrm rot="5400000">
+            <a:off x="4618331" y="3999215"/>
+            <a:ext cx="482343" cy="441812"/>
+          </a:xfrm>
+          <a:prstGeom prst="rightArrow">
+            <a:avLst/>
+          </a:prstGeom>
+          <a:solidFill>
+            <a:schemeClr val="tx1"/>
+          </a:solidFill>
+          <a:ln>
+            <a:solidFill>
+              <a:schemeClr val="tx1"/>
+            </a:solidFill>
+          </a:ln>
+        </p:spPr>
+        <p:style>
+          <a:lnRef idx="2">
+            <a:schemeClr val="accent1">
+              <a:shade val="50000"/>
+            </a:schemeClr>
+          </a:lnRef>
+          <a:fillRef idx="1">
+            <a:schemeClr val="accent1"/>
+          </a:fillRef>
+          <a:effectRef idx="0">
+            <a:schemeClr val="accent1"/>
+          </a:effectRef>
+          <a:fontRef idx="minor">
+            <a:schemeClr val="lt1"/>
+          </a:fontRef>
+        </p:style>
+        <p:txBody>
+          <a:bodyPr rtlCol="0" anchor="ctr"/>
+          <a:lstStyle/>
+          <a:p>
+            <a:pPr algn="ctr"/>
+            <a:endParaRPr lang="en-US"/>
+          </a:p>
+        </p:txBody>
+      </p:sp>
+      <p:sp>
+        <p:nvSpPr>
+          <p:cNvPr id="15" name="Rectangle 14"/>
+          <p:cNvSpPr/>
+          <p:nvPr/>
+        </p:nvSpPr>
+        <p:spPr>
+          <a:xfrm rot="5400000">
+            <a:off x="6483385" y="4700294"/>
+            <a:ext cx="166093" cy="1588606"/>
+          </a:xfrm>
+          <a:prstGeom prst="rect">
+            <a:avLst/>
+          </a:prstGeom>
+          <a:solidFill>
+            <a:schemeClr val="tx1"/>
+          </a:solidFill>
+          <a:ln>
+            <a:solidFill>
+              <a:schemeClr val="tx1"/>
+            </a:solidFill>
+          </a:ln>
+        </p:spPr>
+        <p:style>
+          <a:lnRef idx="2">
+            <a:schemeClr val="accent1">
+              <a:shade val="50000"/>
+            </a:schemeClr>
+          </a:lnRef>
+          <a:fillRef idx="1">
+            <a:schemeClr val="accent1"/>
+          </a:fillRef>
+          <a:effectRef idx="0">
+            <a:schemeClr val="accent1"/>
+          </a:effectRef>
+          <a:fontRef idx="minor">
+            <a:schemeClr val="lt1"/>
+          </a:fontRef>
+        </p:style>
+        <p:txBody>
+          <a:bodyPr rtlCol="0" anchor="ctr"/>
+          <a:lstStyle/>
+          <a:p>
+            <a:pPr algn="ctr"/>
+            <a:endParaRPr lang="en-US"/>
+          </a:p>
+        </p:txBody>
+      </p:sp>
       <p:grpSp>
         <p:nvGrpSpPr>
-          <p:cNvPr id="35" name="Group 34"/>
+          <p:cNvPr id="18" name="Group 17"/>
           <p:cNvGrpSpPr/>
           <p:nvPr/>
         </p:nvGrpSpPr>
         <p:grpSpPr>
           <a:xfrm>
-            <a:off x="0" y="0"/>
-            <a:ext cx="12192000" cy="6858000"/>
-            <a:chOff x="0" y="276789"/>
-            <a:chExt cx="12192000" cy="6858000"/>
+            <a:off x="182880" y="741542"/>
+            <a:ext cx="2068245" cy="1526687"/>
+            <a:chOff x="504348" y="12497886"/>
+            <a:chExt cx="3290098" cy="2308683"/>
           </a:xfrm>
         </p:grpSpPr>
-        <p:sp>
-          <p:nvSpPr>
-            <p:cNvPr id="5" name="Rectangle 4"/>
-            <p:cNvSpPr/>
-            <p:nvPr/>
-          </p:nvSpPr>
-          <p:spPr>
-            <a:xfrm>
-              <a:off x="0" y="276789"/>
-              <a:ext cx="12192000" cy="6858000"/>
-            </a:xfrm>
-            <a:prstGeom prst="rect">
-              <a:avLst/>
-            </a:prstGeom>
-            <a:solidFill>
-              <a:schemeClr val="accent1">
-                <a:alpha val="20000"/>
-              </a:schemeClr>
-            </a:solidFill>
-          </p:spPr>
-          <p:style>
-            <a:lnRef idx="2">
-              <a:schemeClr val="accent1">
-                <a:shade val="50000"/>
-              </a:schemeClr>
-            </a:lnRef>
-            <a:fillRef idx="1">
-              <a:schemeClr val="accent1"/>
-            </a:fillRef>
-            <a:effectRef idx="0">
-              <a:schemeClr val="accent1"/>
-            </a:effectRef>
-            <a:fontRef idx="minor">
-              <a:schemeClr val="lt1"/>
-            </a:fontRef>
-          </p:style>
-          <p:txBody>
-            <a:bodyPr rtlCol="0" anchor="t"/>
-            <a:lstStyle/>
-            <a:p>
-              <a:r>
-                <a:rPr lang="en-US" sz="3600" u="sng" dirty="0" smtClean="0">
-                  <a:solidFill>
-                    <a:schemeClr val="tx1"/>
-                  </a:solidFill>
-                </a:rPr>
-                <a:t>Docker Container</a:t>
-              </a:r>
-              <a:endParaRPr lang="en-US" sz="3600" u="sng" dirty="0">
-                <a:solidFill>
-                  <a:schemeClr val="tx1"/>
-                </a:solidFill>
-              </a:endParaRPr>
-            </a:p>
-          </p:txBody>
-        </p:sp>
-        <p:sp>
-          <p:nvSpPr>
-            <p:cNvPr id="30" name="Rectangle 29"/>
-            <p:cNvSpPr/>
-            <p:nvPr/>
-          </p:nvSpPr>
-          <p:spPr>
-            <a:xfrm>
-              <a:off x="2643809" y="973527"/>
-              <a:ext cx="9322904" cy="5819376"/>
-            </a:xfrm>
-            <a:prstGeom prst="rect">
-              <a:avLst/>
-            </a:prstGeom>
-            <a:solidFill>
-              <a:schemeClr val="accent2">
-                <a:alpha val="50000"/>
-              </a:schemeClr>
-            </a:solidFill>
-          </p:spPr>
-          <p:style>
-            <a:lnRef idx="2">
-              <a:schemeClr val="accent1">
-                <a:shade val="50000"/>
-              </a:schemeClr>
-            </a:lnRef>
-            <a:fillRef idx="1">
-              <a:schemeClr val="accent1"/>
-            </a:fillRef>
-            <a:effectRef idx="0">
-              <a:schemeClr val="accent1"/>
-            </a:effectRef>
-            <a:fontRef idx="minor">
-              <a:schemeClr val="lt1"/>
-            </a:fontRef>
-          </p:style>
-          <p:txBody>
-            <a:bodyPr rtlCol="0" anchor="t"/>
-            <a:lstStyle/>
-            <a:p>
-              <a:r>
-                <a:rPr lang="en-US" sz="3600" u="sng" dirty="0" smtClean="0">
-                  <a:solidFill>
-                    <a:schemeClr val="tx1"/>
-                  </a:solidFill>
-                </a:rPr>
-                <a:t>Spark-Based Analytics Platform</a:t>
-              </a:r>
-              <a:endParaRPr lang="en-US" sz="3600" u="sng" dirty="0">
-                <a:solidFill>
-                  <a:schemeClr val="tx1"/>
-                </a:solidFill>
-              </a:endParaRPr>
-            </a:p>
-          </p:txBody>
-        </p:sp>
-        <p:sp>
-          <p:nvSpPr>
-            <p:cNvPr id="6" name="Rectangle 5"/>
-            <p:cNvSpPr/>
-            <p:nvPr/>
-          </p:nvSpPr>
-          <p:spPr>
-            <a:xfrm>
-              <a:off x="2939233" y="1669381"/>
-              <a:ext cx="3708830" cy="2315192"/>
-            </a:xfrm>
-            <a:prstGeom prst="rect">
-              <a:avLst/>
-            </a:prstGeom>
-          </p:spPr>
-          <p:style>
-            <a:lnRef idx="2">
-              <a:schemeClr val="accent1">
-                <a:shade val="50000"/>
-              </a:schemeClr>
-            </a:lnRef>
-            <a:fillRef idx="1">
-              <a:schemeClr val="accent1"/>
-            </a:fillRef>
-            <a:effectRef idx="0">
-              <a:schemeClr val="accent1"/>
-            </a:effectRef>
-            <a:fontRef idx="minor">
-              <a:schemeClr val="lt1"/>
-            </a:fontRef>
-          </p:style>
-          <p:txBody>
-            <a:bodyPr rtlCol="0" anchor="t"/>
-            <a:lstStyle/>
-            <a:p>
-              <a:pPr algn="ctr"/>
-              <a:r>
-                <a:rPr lang="en-US" sz="2800" u="sng" dirty="0" smtClean="0"/>
-                <a:t>Preprocessing</a:t>
-              </a:r>
-            </a:p>
-            <a:p>
-              <a:pPr marL="330200" indent="-330200">
-                <a:buFont typeface="Arial" charset="0"/>
-                <a:buChar char="•"/>
-              </a:pPr>
-              <a:r>
-                <a:rPr lang="en-US" sz="2800" dirty="0" smtClean="0"/>
-                <a:t>Restricts data to subset specific to a classification task</a:t>
-              </a:r>
-              <a:endParaRPr lang="en-US" sz="2800" dirty="0" smtClean="0"/>
-            </a:p>
-          </p:txBody>
-        </p:sp>
-        <p:sp>
-          <p:nvSpPr>
-            <p:cNvPr id="7" name="Rectangle 6"/>
-            <p:cNvSpPr/>
-            <p:nvPr/>
-          </p:nvSpPr>
-          <p:spPr>
-            <a:xfrm>
-              <a:off x="7815674" y="1675221"/>
-              <a:ext cx="3273939" cy="2309352"/>
-            </a:xfrm>
-            <a:prstGeom prst="rect">
-              <a:avLst/>
-            </a:prstGeom>
-            <a:solidFill>
-              <a:schemeClr val="accent1"/>
-            </a:solidFill>
-            <a:ln>
-              <a:solidFill>
-                <a:schemeClr val="accent6">
-                  <a:lumMod val="50000"/>
-                </a:schemeClr>
-              </a:solidFill>
-            </a:ln>
-          </p:spPr>
-          <p:style>
-            <a:lnRef idx="2">
-              <a:schemeClr val="accent1">
-                <a:shade val="50000"/>
-              </a:schemeClr>
-            </a:lnRef>
-            <a:fillRef idx="1">
-              <a:schemeClr val="accent1"/>
-            </a:fillRef>
-            <a:effectRef idx="0">
-              <a:schemeClr val="accent1"/>
-            </a:effectRef>
-            <a:fontRef idx="minor">
-              <a:schemeClr val="lt1"/>
-            </a:fontRef>
-          </p:style>
-          <p:txBody>
-            <a:bodyPr rtlCol="0" anchor="t"/>
-            <a:lstStyle/>
-            <a:p>
-              <a:pPr algn="ctr"/>
-              <a:r>
-                <a:rPr lang="en-US" sz="2800" u="sng" dirty="0" smtClean="0"/>
-                <a:t>Analysis Tools</a:t>
-              </a:r>
-            </a:p>
-            <a:p>
-              <a:pPr marL="457200" indent="-457200">
-                <a:buFont typeface="Arial" charset="0"/>
-                <a:buChar char="•"/>
-              </a:pPr>
-              <a:r>
-                <a:rPr lang="en-US" sz="2800" dirty="0" err="1" smtClean="0"/>
-                <a:t>MLLib</a:t>
-              </a:r>
-              <a:r>
-                <a:rPr lang="en-US" sz="2800" dirty="0" smtClean="0"/>
-                <a:t> Classifiers</a:t>
-              </a:r>
-            </a:p>
-            <a:p>
-              <a:pPr marL="457200" indent="-457200">
-                <a:buFont typeface="Arial" charset="0"/>
-                <a:buChar char="•"/>
-              </a:pPr>
-              <a:r>
-                <a:rPr lang="en-US" sz="2800" dirty="0" smtClean="0"/>
-                <a:t>Custom-built classifiers</a:t>
-              </a:r>
-              <a:endParaRPr lang="en-US" sz="2800" dirty="0" smtClean="0"/>
-            </a:p>
-          </p:txBody>
-        </p:sp>
-        <p:sp>
-          <p:nvSpPr>
-            <p:cNvPr id="8" name="Rectangle 7"/>
-            <p:cNvSpPr/>
-            <p:nvPr/>
-          </p:nvSpPr>
-          <p:spPr>
-            <a:xfrm>
-              <a:off x="7819932" y="4784658"/>
-              <a:ext cx="3265422" cy="1553970"/>
-            </a:xfrm>
-            <a:prstGeom prst="rect">
-              <a:avLst/>
-            </a:prstGeom>
-          </p:spPr>
-          <p:style>
-            <a:lnRef idx="2">
-              <a:schemeClr val="accent1">
-                <a:shade val="50000"/>
-              </a:schemeClr>
-            </a:lnRef>
-            <a:fillRef idx="1">
-              <a:schemeClr val="accent1"/>
-            </a:fillRef>
-            <a:effectRef idx="0">
-              <a:schemeClr val="accent1"/>
-            </a:effectRef>
-            <a:fontRef idx="minor">
-              <a:schemeClr val="lt1"/>
-            </a:fontRef>
-          </p:style>
-          <p:txBody>
-            <a:bodyPr rtlCol="0" anchor="t"/>
-            <a:lstStyle/>
-            <a:p>
-              <a:pPr algn="ctr"/>
-              <a:r>
-                <a:rPr lang="en-US" sz="2800" u="sng" dirty="0" smtClean="0"/>
-                <a:t>Visualization</a:t>
-              </a:r>
-            </a:p>
-            <a:p>
-              <a:pPr marL="457200" indent="-457200">
-                <a:buFont typeface="Arial" charset="0"/>
-                <a:buChar char="•"/>
-              </a:pPr>
-              <a:r>
-                <a:rPr lang="en-US" sz="2800" dirty="0" smtClean="0"/>
-                <a:t>For evaluation</a:t>
-              </a:r>
-              <a:endParaRPr lang="en-US" sz="2800" dirty="0" smtClean="0"/>
-            </a:p>
-          </p:txBody>
-        </p:sp>
-        <p:sp>
-          <p:nvSpPr>
-            <p:cNvPr id="9" name="Snip Single Corner Rectangle 8"/>
-            <p:cNvSpPr/>
-            <p:nvPr/>
-          </p:nvSpPr>
-          <p:spPr>
-            <a:xfrm>
-              <a:off x="3934766" y="4784658"/>
-              <a:ext cx="1717763" cy="1582775"/>
-            </a:xfrm>
-            <a:prstGeom prst="snip1Rect">
-              <a:avLst/>
-            </a:prstGeom>
-            <a:solidFill>
-              <a:schemeClr val="accent6"/>
-            </a:solidFill>
-            <a:ln>
-              <a:solidFill>
-                <a:schemeClr val="accent3">
-                  <a:lumMod val="50000"/>
-                </a:schemeClr>
-              </a:solidFill>
-            </a:ln>
-          </p:spPr>
-          <p:style>
-            <a:lnRef idx="2">
-              <a:schemeClr val="accent1">
-                <a:shade val="50000"/>
-              </a:schemeClr>
-            </a:lnRef>
-            <a:fillRef idx="1">
-              <a:schemeClr val="accent1"/>
-            </a:fillRef>
-            <a:effectRef idx="0">
-              <a:schemeClr val="accent1"/>
-            </a:effectRef>
-            <a:fontRef idx="minor">
-              <a:schemeClr val="lt1"/>
-            </a:fontRef>
-          </p:style>
-          <p:txBody>
-            <a:bodyPr rtlCol="0" anchor="ctr"/>
-            <a:lstStyle/>
-            <a:p>
-              <a:pPr algn="ctr"/>
-              <a:r>
-                <a:rPr lang="en-US" sz="2800" dirty="0" smtClean="0"/>
-                <a:t>Targeted Subset of</a:t>
-              </a:r>
-              <a:br>
-                <a:rPr lang="en-US" sz="2800" dirty="0" smtClean="0"/>
-              </a:br>
-              <a:r>
-                <a:rPr lang="en-US" sz="2800" dirty="0" smtClean="0"/>
-                <a:t>Data</a:t>
-              </a:r>
-              <a:endParaRPr lang="en-US" sz="2800" dirty="0"/>
-            </a:p>
-          </p:txBody>
-        </p:sp>
-        <p:sp>
-          <p:nvSpPr>
-            <p:cNvPr id="10" name="Right Arrow 9"/>
-            <p:cNvSpPr/>
-            <p:nvPr/>
-          </p:nvSpPr>
-          <p:spPr>
-            <a:xfrm rot="5400000">
-              <a:off x="4552475" y="4163710"/>
-              <a:ext cx="482343" cy="441812"/>
-            </a:xfrm>
-            <a:prstGeom prst="rightArrow">
-              <a:avLst/>
-            </a:prstGeom>
-            <a:solidFill>
-              <a:schemeClr val="tx1"/>
-            </a:solidFill>
-            <a:ln>
-              <a:solidFill>
-                <a:schemeClr val="tx1"/>
-              </a:solidFill>
-            </a:ln>
-          </p:spPr>
-          <p:style>
-            <a:lnRef idx="2">
-              <a:schemeClr val="accent1">
-                <a:shade val="50000"/>
-              </a:schemeClr>
-            </a:lnRef>
-            <a:fillRef idx="1">
-              <a:schemeClr val="accent1"/>
-            </a:fillRef>
-            <a:effectRef idx="0">
-              <a:schemeClr val="accent1"/>
-            </a:effectRef>
-            <a:fontRef idx="minor">
-              <a:schemeClr val="lt1"/>
-            </a:fontRef>
-          </p:style>
-          <p:txBody>
-            <a:bodyPr rtlCol="0" anchor="ctr"/>
-            <a:lstStyle/>
-            <a:p>
-              <a:pPr algn="ctr"/>
-              <a:endParaRPr lang="en-US"/>
-            </a:p>
-          </p:txBody>
-        </p:sp>
-        <p:sp>
-          <p:nvSpPr>
-            <p:cNvPr id="15" name="Rectangle 14"/>
-            <p:cNvSpPr/>
-            <p:nvPr/>
-          </p:nvSpPr>
-          <p:spPr>
-            <a:xfrm rot="5400000">
-              <a:off x="6417529" y="4864789"/>
-              <a:ext cx="166093" cy="1588606"/>
-            </a:xfrm>
-            <a:prstGeom prst="rect">
-              <a:avLst/>
-            </a:prstGeom>
-            <a:solidFill>
-              <a:schemeClr val="tx1"/>
-            </a:solidFill>
-            <a:ln>
-              <a:solidFill>
-                <a:schemeClr val="tx1"/>
-              </a:solidFill>
-            </a:ln>
-          </p:spPr>
-          <p:style>
-            <a:lnRef idx="2">
-              <a:schemeClr val="accent1">
-                <a:shade val="50000"/>
-              </a:schemeClr>
-            </a:lnRef>
-            <a:fillRef idx="1">
-              <a:schemeClr val="accent1"/>
-            </a:fillRef>
-            <a:effectRef idx="0">
-              <a:schemeClr val="accent1"/>
-            </a:effectRef>
-            <a:fontRef idx="minor">
-              <a:schemeClr val="lt1"/>
-            </a:fontRef>
-          </p:style>
-          <p:txBody>
-            <a:bodyPr rtlCol="0" anchor="ctr"/>
-            <a:lstStyle/>
-            <a:p>
-              <a:pPr algn="ctr"/>
-              <a:endParaRPr lang="en-US"/>
-            </a:p>
-          </p:txBody>
-        </p:sp>
         <p:grpSp>
           <p:nvGrpSpPr>
-            <p:cNvPr id="18" name="Group 17"/>
+            <p:cNvPr id="25" name="Group 24"/>
             <p:cNvGrpSpPr/>
             <p:nvPr/>
           </p:nvGrpSpPr>
           <p:grpSpPr>
             <a:xfrm>
-              <a:off x="329209" y="973527"/>
-              <a:ext cx="2068245" cy="1526687"/>
-              <a:chOff x="504348" y="12497886"/>
-              <a:chExt cx="3290098" cy="2308683"/>
+              <a:off x="504348" y="12497886"/>
+              <a:ext cx="2510314" cy="2308683"/>
+              <a:chOff x="716724" y="12653622"/>
+              <a:chExt cx="2510314" cy="2308683"/>
             </a:xfrm>
           </p:grpSpPr>
-          <p:grpSp>
-            <p:nvGrpSpPr>
-              <p:cNvPr id="25" name="Group 24"/>
-              <p:cNvGrpSpPr/>
-              <p:nvPr/>
-            </p:nvGrpSpPr>
-            <p:grpSpPr>
-              <a:xfrm>
-                <a:off x="504348" y="12497886"/>
-                <a:ext cx="2510314" cy="2308683"/>
-                <a:chOff x="716724" y="12653622"/>
-                <a:chExt cx="2510314" cy="2308683"/>
-              </a:xfrm>
-            </p:grpSpPr>
-            <p:sp>
-              <p:nvSpPr>
-                <p:cNvPr id="27" name="Snip Single Corner Rectangle 26"/>
-                <p:cNvSpPr/>
-                <p:nvPr/>
-              </p:nvSpPr>
-              <p:spPr>
-                <a:xfrm>
-                  <a:off x="716724" y="12653622"/>
-                  <a:ext cx="1981200" cy="1811099"/>
-                </a:xfrm>
-                <a:prstGeom prst="snip1Rect">
-                  <a:avLst/>
-                </a:prstGeom>
-                <a:solidFill>
-                  <a:schemeClr val="accent6"/>
-                </a:solidFill>
-                <a:ln>
-                  <a:solidFill>
-                    <a:schemeClr val="accent3">
-                      <a:lumMod val="50000"/>
-                    </a:schemeClr>
-                  </a:solidFill>
-                </a:ln>
-              </p:spPr>
-              <p:style>
-                <a:lnRef idx="2">
-                  <a:schemeClr val="accent1">
-                    <a:shade val="50000"/>
-                  </a:schemeClr>
-                </a:lnRef>
-                <a:fillRef idx="1">
-                  <a:schemeClr val="accent1"/>
-                </a:fillRef>
-                <a:effectRef idx="0">
-                  <a:schemeClr val="accent1"/>
-                </a:effectRef>
-                <a:fontRef idx="minor">
-                  <a:schemeClr val="lt1"/>
-                </a:fontRef>
-              </p:style>
-              <p:txBody>
-                <a:bodyPr rtlCol="0" anchor="ctr"/>
-                <a:lstStyle/>
-                <a:p>
-                  <a:pPr algn="ctr"/>
-                  <a:endParaRPr lang="en-US" b="1" dirty="0"/>
-                </a:p>
-              </p:txBody>
-            </p:sp>
-            <p:sp>
-              <p:nvSpPr>
-                <p:cNvPr id="28" name="Snip Single Corner Rectangle 27"/>
-                <p:cNvSpPr/>
-                <p:nvPr/>
-              </p:nvSpPr>
-              <p:spPr>
-                <a:xfrm>
-                  <a:off x="981281" y="12902414"/>
-                  <a:ext cx="1981200" cy="1811099"/>
-                </a:xfrm>
-                <a:prstGeom prst="snip1Rect">
-                  <a:avLst/>
-                </a:prstGeom>
-                <a:solidFill>
-                  <a:schemeClr val="accent6"/>
-                </a:solidFill>
-                <a:ln>
-                  <a:solidFill>
-                    <a:schemeClr val="accent3">
-                      <a:lumMod val="50000"/>
-                    </a:schemeClr>
-                  </a:solidFill>
-                </a:ln>
-              </p:spPr>
-              <p:style>
-                <a:lnRef idx="2">
-                  <a:schemeClr val="accent1">
-                    <a:shade val="50000"/>
-                  </a:schemeClr>
-                </a:lnRef>
-                <a:fillRef idx="1">
-                  <a:schemeClr val="accent1"/>
-                </a:fillRef>
-                <a:effectRef idx="0">
-                  <a:schemeClr val="accent1"/>
-                </a:effectRef>
-                <a:fontRef idx="minor">
-                  <a:schemeClr val="lt1"/>
-                </a:fontRef>
-              </p:style>
-              <p:txBody>
-                <a:bodyPr rtlCol="0" anchor="ctr"/>
-                <a:lstStyle/>
-                <a:p>
-                  <a:pPr algn="ctr"/>
-                  <a:endParaRPr lang="en-US" b="1"/>
-                </a:p>
-              </p:txBody>
-            </p:sp>
-            <p:sp>
-              <p:nvSpPr>
-                <p:cNvPr id="29" name="Snip Single Corner Rectangle 28"/>
-                <p:cNvSpPr/>
-                <p:nvPr/>
-              </p:nvSpPr>
-              <p:spPr>
-                <a:xfrm>
-                  <a:off x="1245838" y="13151206"/>
-                  <a:ext cx="1981200" cy="1811099"/>
-                </a:xfrm>
-                <a:prstGeom prst="snip1Rect">
-                  <a:avLst/>
-                </a:prstGeom>
-                <a:solidFill>
-                  <a:schemeClr val="accent6"/>
-                </a:solidFill>
-                <a:ln>
-                  <a:solidFill>
-                    <a:schemeClr val="accent3">
-                      <a:lumMod val="50000"/>
-                    </a:schemeClr>
-                  </a:solidFill>
-                </a:ln>
-              </p:spPr>
-              <p:style>
-                <a:lnRef idx="2">
-                  <a:schemeClr val="accent1">
-                    <a:shade val="50000"/>
-                  </a:schemeClr>
-                </a:lnRef>
-                <a:fillRef idx="1">
-                  <a:schemeClr val="accent1"/>
-                </a:fillRef>
-                <a:effectRef idx="0">
-                  <a:schemeClr val="accent1"/>
-                </a:effectRef>
-                <a:fontRef idx="minor">
-                  <a:schemeClr val="lt1"/>
-                </a:fontRef>
-              </p:style>
-              <p:txBody>
-                <a:bodyPr rtlCol="0" anchor="ctr"/>
-                <a:lstStyle/>
-                <a:p>
-                  <a:pPr algn="ctr"/>
-                  <a:r>
-                    <a:rPr lang="en-US" sz="2400" dirty="0" smtClean="0"/>
-                    <a:t>Track</a:t>
-                  </a:r>
-                  <a:br>
-                    <a:rPr lang="en-US" sz="2400" dirty="0" smtClean="0"/>
-                  </a:br>
-                  <a:r>
-                    <a:rPr lang="en-US" sz="2400" dirty="0" smtClean="0"/>
-                    <a:t>Defect</a:t>
-                  </a:r>
-                  <a:br>
-                    <a:rPr lang="en-US" sz="2400" dirty="0" smtClean="0"/>
-                  </a:br>
-                  <a:r>
-                    <a:rPr lang="en-US" sz="2400" dirty="0" smtClean="0"/>
-                    <a:t>Data</a:t>
-                  </a:r>
-                  <a:endParaRPr lang="en-US" sz="2400" dirty="0"/>
-                </a:p>
-              </p:txBody>
-            </p:sp>
-          </p:grpSp>
           <p:sp>
             <p:nvSpPr>
-              <p:cNvPr id="26" name="Right Arrow 25"/>
+              <p:cNvPr id="27" name="Snip Single Corner Rectangle 26"/>
               <p:cNvSpPr/>
               <p:nvPr/>
             </p:nvSpPr>
             <p:spPr>
               <a:xfrm>
-                <a:off x="3131670" y="13743114"/>
-                <a:ext cx="662776" cy="462955"/>
+                <a:off x="716724" y="12653622"/>
+                <a:ext cx="1981200" cy="1811099"/>
               </a:xfrm>
-              <a:prstGeom prst="rightArrow">
+              <a:prstGeom prst="snip1Rect">
                 <a:avLst/>
               </a:prstGeom>
               <a:solidFill>
-                <a:schemeClr val="tx1"/>
+                <a:schemeClr val="accent6"/>
               </a:solidFill>
               <a:ln>
                 <a:solidFill>
-                  <a:schemeClr val="tx1"/>
+                  <a:schemeClr val="accent3">
+                    <a:lumMod val="50000"/>
+                  </a:schemeClr>
                 </a:solidFill>
               </a:ln>
             </p:spPr>
@@ -3674,228 +3496,32 @@
               <a:lstStyle/>
               <a:p>
                 <a:pPr algn="ctr"/>
-                <a:endParaRPr lang="en-US"/>
+                <a:endParaRPr lang="en-US" b="1" dirty="0"/>
               </a:p>
             </p:txBody>
           </p:sp>
-        </p:grpSp>
-        <p:grpSp>
-          <p:nvGrpSpPr>
-            <p:cNvPr id="19" name="Group 18"/>
-            <p:cNvGrpSpPr/>
-            <p:nvPr/>
-          </p:nvGrpSpPr>
-          <p:grpSpPr>
-            <a:xfrm>
-              <a:off x="329209" y="2622408"/>
-              <a:ext cx="2076061" cy="1526687"/>
-              <a:chOff x="504348" y="15411336"/>
-              <a:chExt cx="3302531" cy="2308683"/>
-            </a:xfrm>
-          </p:grpSpPr>
-          <p:grpSp>
-            <p:nvGrpSpPr>
-              <p:cNvPr id="20" name="Group 19"/>
-              <p:cNvGrpSpPr/>
-              <p:nvPr/>
-            </p:nvGrpSpPr>
-            <p:grpSpPr>
-              <a:xfrm>
-                <a:off x="504348" y="15411336"/>
-                <a:ext cx="2510314" cy="2308683"/>
-                <a:chOff x="716724" y="12653622"/>
-                <a:chExt cx="2510314" cy="2308683"/>
-              </a:xfrm>
-            </p:grpSpPr>
-            <p:sp>
-              <p:nvSpPr>
-                <p:cNvPr id="22" name="Snip Single Corner Rectangle 21"/>
-                <p:cNvSpPr/>
-                <p:nvPr/>
-              </p:nvSpPr>
-              <p:spPr>
-                <a:xfrm>
-                  <a:off x="716724" y="12653622"/>
-                  <a:ext cx="1981200" cy="1811099"/>
-                </a:xfrm>
-                <a:prstGeom prst="snip1Rect">
-                  <a:avLst/>
-                </a:prstGeom>
-                <a:solidFill>
-                  <a:schemeClr val="accent6"/>
-                </a:solidFill>
-                <a:ln>
-                  <a:solidFill>
-                    <a:schemeClr val="accent3">
-                      <a:lumMod val="50000"/>
-                    </a:schemeClr>
-                  </a:solidFill>
-                </a:ln>
-              </p:spPr>
-              <p:style>
-                <a:lnRef idx="2">
-                  <a:schemeClr val="accent1">
-                    <a:shade val="50000"/>
-                  </a:schemeClr>
-                </a:lnRef>
-                <a:fillRef idx="1">
-                  <a:schemeClr val="accent1"/>
-                </a:fillRef>
-                <a:effectRef idx="0">
-                  <a:schemeClr val="accent1"/>
-                </a:effectRef>
-                <a:fontRef idx="minor">
-                  <a:schemeClr val="lt1"/>
-                </a:fontRef>
-              </p:style>
-              <p:txBody>
-                <a:bodyPr rtlCol="0" anchor="ctr"/>
-                <a:lstStyle/>
-                <a:p>
-                  <a:pPr algn="ctr"/>
-                  <a:endParaRPr lang="en-US" b="1" dirty="0"/>
-                </a:p>
-              </p:txBody>
-            </p:sp>
-            <p:sp>
-              <p:nvSpPr>
-                <p:cNvPr id="23" name="Snip Single Corner Rectangle 22"/>
-                <p:cNvSpPr/>
-                <p:nvPr/>
-              </p:nvSpPr>
-              <p:spPr>
-                <a:xfrm>
-                  <a:off x="981281" y="12902414"/>
-                  <a:ext cx="1981200" cy="1811099"/>
-                </a:xfrm>
-                <a:prstGeom prst="snip1Rect">
-                  <a:avLst/>
-                </a:prstGeom>
-                <a:solidFill>
-                  <a:schemeClr val="accent6"/>
-                </a:solidFill>
-                <a:ln>
-                  <a:solidFill>
-                    <a:schemeClr val="accent3">
-                      <a:lumMod val="50000"/>
-                    </a:schemeClr>
-                  </a:solidFill>
-                </a:ln>
-              </p:spPr>
-              <p:style>
-                <a:lnRef idx="2">
-                  <a:schemeClr val="accent1">
-                    <a:shade val="50000"/>
-                  </a:schemeClr>
-                </a:lnRef>
-                <a:fillRef idx="1">
-                  <a:schemeClr val="accent1"/>
-                </a:fillRef>
-                <a:effectRef idx="0">
-                  <a:schemeClr val="accent1"/>
-                </a:effectRef>
-                <a:fontRef idx="minor">
-                  <a:schemeClr val="lt1"/>
-                </a:fontRef>
-              </p:style>
-              <p:txBody>
-                <a:bodyPr rtlCol="0" anchor="ctr"/>
-                <a:lstStyle/>
-                <a:p>
-                  <a:pPr algn="ctr"/>
-                  <a:endParaRPr lang="en-US" b="1"/>
-                </a:p>
-              </p:txBody>
-            </p:sp>
-            <p:sp>
-              <p:nvSpPr>
-                <p:cNvPr id="24" name="Snip Single Corner Rectangle 23"/>
-                <p:cNvSpPr/>
-                <p:nvPr/>
-              </p:nvSpPr>
-              <p:spPr>
-                <a:xfrm>
-                  <a:off x="1245838" y="13151206"/>
-                  <a:ext cx="1981200" cy="1811099"/>
-                </a:xfrm>
-                <a:prstGeom prst="snip1Rect">
-                  <a:avLst/>
-                </a:prstGeom>
-                <a:solidFill>
-                  <a:schemeClr val="accent6"/>
-                </a:solidFill>
-                <a:ln>
-                  <a:solidFill>
-                    <a:schemeClr val="accent3">
-                      <a:lumMod val="50000"/>
-                    </a:schemeClr>
-                  </a:solidFill>
-                </a:ln>
-              </p:spPr>
-              <p:style>
-                <a:lnRef idx="2">
-                  <a:schemeClr val="accent1">
-                    <a:shade val="50000"/>
-                  </a:schemeClr>
-                </a:lnRef>
-                <a:fillRef idx="1">
-                  <a:schemeClr val="accent1"/>
-                </a:fillRef>
-                <a:effectRef idx="0">
-                  <a:schemeClr val="accent1"/>
-                </a:effectRef>
-                <a:fontRef idx="minor">
-                  <a:schemeClr val="lt1"/>
-                </a:fontRef>
-              </p:style>
-              <p:txBody>
-                <a:bodyPr rtlCol="0" anchor="ctr"/>
-                <a:lstStyle/>
-                <a:p>
-                  <a:pPr algn="ctr"/>
-                  <a:r>
-                    <a:rPr lang="en-US" sz="2400" dirty="0" smtClean="0"/>
-                    <a:t>Rail</a:t>
-                  </a:r>
-                  <a:br>
-                    <a:rPr lang="en-US" sz="2400" dirty="0" smtClean="0"/>
-                  </a:br>
-                  <a:r>
-                    <a:rPr lang="en-US" sz="2400" dirty="0" smtClean="0"/>
-                    <a:t>Defect</a:t>
-                  </a:r>
-                  <a:br>
-                    <a:rPr lang="en-US" sz="2400" dirty="0" smtClean="0"/>
-                  </a:br>
-                  <a:r>
-                    <a:rPr lang="en-US" sz="2400" dirty="0" smtClean="0"/>
-                    <a:t>Data</a:t>
-                  </a:r>
-                  <a:endParaRPr lang="en-US" sz="2400" dirty="0"/>
-                </a:p>
-              </p:txBody>
-            </p:sp>
-          </p:grpSp>
           <p:sp>
             <p:nvSpPr>
-              <p:cNvPr id="21" name="Right Arrow 20"/>
+              <p:cNvPr id="28" name="Snip Single Corner Rectangle 27"/>
               <p:cNvSpPr/>
               <p:nvPr/>
             </p:nvSpPr>
             <p:spPr>
               <a:xfrm>
-                <a:off x="3144103" y="16642080"/>
-                <a:ext cx="662776" cy="462955"/>
+                <a:off x="981281" y="12902414"/>
+                <a:ext cx="1981200" cy="1811099"/>
               </a:xfrm>
-              <a:prstGeom prst="rightArrow">
+              <a:prstGeom prst="snip1Rect">
                 <a:avLst/>
               </a:prstGeom>
               <a:solidFill>
-                <a:schemeClr val="tx1"/>
+                <a:schemeClr val="accent6"/>
               </a:solidFill>
               <a:ln>
                 <a:solidFill>
-                  <a:schemeClr val="tx1"/>
+                  <a:schemeClr val="accent3">
+                    <a:lumMod val="50000"/>
+                  </a:schemeClr>
                 </a:solidFill>
               </a:ln>
             </p:spPr>
@@ -3920,117 +3546,89 @@
               <a:lstStyle/>
               <a:p>
                 <a:pPr algn="ctr"/>
-                <a:endParaRPr lang="en-US"/>
+                <a:endParaRPr lang="en-US" b="1"/>
+              </a:p>
+            </p:txBody>
+          </p:sp>
+          <p:sp>
+            <p:nvSpPr>
+              <p:cNvPr id="29" name="Snip Single Corner Rectangle 28"/>
+              <p:cNvSpPr/>
+              <p:nvPr/>
+            </p:nvSpPr>
+            <p:spPr>
+              <a:xfrm>
+                <a:off x="1245838" y="13151206"/>
+                <a:ext cx="1981200" cy="1811099"/>
+              </a:xfrm>
+              <a:prstGeom prst="snip1Rect">
+                <a:avLst/>
+              </a:prstGeom>
+              <a:solidFill>
+                <a:schemeClr val="accent6"/>
+              </a:solidFill>
+              <a:ln>
+                <a:solidFill>
+                  <a:schemeClr val="accent3">
+                    <a:lumMod val="50000"/>
+                  </a:schemeClr>
+                </a:solidFill>
+              </a:ln>
+            </p:spPr>
+            <p:style>
+              <a:lnRef idx="2">
+                <a:schemeClr val="accent1">
+                  <a:shade val="50000"/>
+                </a:schemeClr>
+              </a:lnRef>
+              <a:fillRef idx="1">
+                <a:schemeClr val="accent1"/>
+              </a:fillRef>
+              <a:effectRef idx="0">
+                <a:schemeClr val="accent1"/>
+              </a:effectRef>
+              <a:fontRef idx="minor">
+                <a:schemeClr val="lt1"/>
+              </a:fontRef>
+            </p:style>
+            <p:txBody>
+              <a:bodyPr rtlCol="0" anchor="ctr"/>
+              <a:lstStyle/>
+              <a:p>
+                <a:pPr algn="ctr"/>
+                <a:r>
+                  <a:rPr lang="en-US" sz="2400" dirty="0" smtClean="0"/>
+                  <a:t>Track</a:t>
+                </a:r>
+                <a:br>
+                  <a:rPr lang="en-US" sz="2400" dirty="0" smtClean="0"/>
+                </a:br>
+                <a:r>
+                  <a:rPr lang="en-US" sz="2400" dirty="0" smtClean="0"/>
+                  <a:t>Defect</a:t>
+                </a:r>
+                <a:br>
+                  <a:rPr lang="en-US" sz="2400" dirty="0" smtClean="0"/>
+                </a:br>
+                <a:r>
+                  <a:rPr lang="en-US" sz="2400" dirty="0" smtClean="0"/>
+                  <a:t>Data</a:t>
+                </a:r>
+                <a:endParaRPr lang="en-US" sz="2400" dirty="0"/>
               </a:p>
             </p:txBody>
           </p:sp>
         </p:grpSp>
         <p:sp>
           <p:nvSpPr>
-            <p:cNvPr id="32" name="Rectangle 31"/>
+            <p:cNvPr id="26" name="Right Arrow 25"/>
             <p:cNvSpPr/>
             <p:nvPr/>
           </p:nvSpPr>
           <p:spPr>
             <a:xfrm>
-              <a:off x="7152640" y="2500214"/>
-              <a:ext cx="142239" cy="3211801"/>
-            </a:xfrm>
-            <a:prstGeom prst="rect">
-              <a:avLst/>
-            </a:prstGeom>
-            <a:solidFill>
-              <a:schemeClr val="tx1"/>
-            </a:solidFill>
-            <a:ln>
-              <a:solidFill>
-                <a:schemeClr val="tx1"/>
-              </a:solidFill>
-            </a:ln>
-          </p:spPr>
-          <p:style>
-            <a:lnRef idx="2">
-              <a:schemeClr val="accent1">
-                <a:shade val="50000"/>
-              </a:schemeClr>
-            </a:lnRef>
-            <a:fillRef idx="1">
-              <a:schemeClr val="accent1"/>
-            </a:fillRef>
-            <a:effectRef idx="0">
-              <a:schemeClr val="accent1"/>
-            </a:effectRef>
-            <a:fontRef idx="minor">
-              <a:schemeClr val="lt1"/>
-            </a:fontRef>
-          </p:style>
-          <p:txBody>
-            <a:bodyPr rtlCol="0" anchor="ctr"/>
-            <a:lstStyle/>
-            <a:p>
-              <a:pPr algn="ctr"/>
-              <a:endParaRPr lang="en-US"/>
-            </a:p>
-          </p:txBody>
-        </p:sp>
-        <p:sp>
-          <p:nvSpPr>
-            <p:cNvPr id="33" name="Right Arrow 32"/>
-            <p:cNvSpPr/>
-            <p:nvPr/>
-          </p:nvSpPr>
-          <p:spPr>
-            <a:xfrm>
-              <a:off x="7152640" y="2395434"/>
-              <a:ext cx="482343" cy="251788"/>
-            </a:xfrm>
-            <a:prstGeom prst="rightArrow">
-              <a:avLst/>
-            </a:prstGeom>
-            <a:solidFill>
-              <a:schemeClr val="tx1"/>
-            </a:solidFill>
-            <a:ln>
-              <a:solidFill>
-                <a:schemeClr val="tx1"/>
-              </a:solidFill>
-            </a:ln>
-          </p:spPr>
-          <p:style>
-            <a:lnRef idx="2">
-              <a:schemeClr val="accent1">
-                <a:shade val="50000"/>
-              </a:schemeClr>
-            </a:lnRef>
-            <a:fillRef idx="1">
-              <a:schemeClr val="accent1"/>
-            </a:fillRef>
-            <a:effectRef idx="0">
-              <a:schemeClr val="accent1"/>
-            </a:effectRef>
-            <a:fontRef idx="minor">
-              <a:schemeClr val="lt1"/>
-            </a:fontRef>
-          </p:style>
-          <p:txBody>
-            <a:bodyPr rtlCol="0" anchor="ctr"/>
-            <a:lstStyle/>
-            <a:p>
-              <a:pPr algn="ctr"/>
-              <a:endParaRPr lang="en-US"/>
-            </a:p>
-          </p:txBody>
-        </p:sp>
-        <p:sp>
-          <p:nvSpPr>
-            <p:cNvPr id="34" name="Right Arrow 33"/>
-            <p:cNvSpPr/>
-            <p:nvPr/>
-          </p:nvSpPr>
-          <p:spPr>
-            <a:xfrm rot="5400000">
-              <a:off x="9211472" y="4163710"/>
-              <a:ext cx="482343" cy="441812"/>
+              <a:off x="3131670" y="13743114"/>
+              <a:ext cx="662776" cy="462955"/>
             </a:xfrm>
             <a:prstGeom prst="rightArrow">
               <a:avLst/>
@@ -4070,6 +3668,558 @@
           </p:txBody>
         </p:sp>
       </p:grpSp>
+      <p:grpSp>
+        <p:nvGrpSpPr>
+          <p:cNvPr id="19" name="Group 18"/>
+          <p:cNvGrpSpPr/>
+          <p:nvPr/>
+        </p:nvGrpSpPr>
+        <p:grpSpPr>
+          <a:xfrm>
+            <a:off x="182880" y="2390423"/>
+            <a:ext cx="2076061" cy="1526687"/>
+            <a:chOff x="504348" y="15411336"/>
+            <a:chExt cx="3302531" cy="2308683"/>
+          </a:xfrm>
+        </p:grpSpPr>
+        <p:grpSp>
+          <p:nvGrpSpPr>
+            <p:cNvPr id="20" name="Group 19"/>
+            <p:cNvGrpSpPr/>
+            <p:nvPr/>
+          </p:nvGrpSpPr>
+          <p:grpSpPr>
+            <a:xfrm>
+              <a:off x="504348" y="15411336"/>
+              <a:ext cx="2510314" cy="2308683"/>
+              <a:chOff x="716724" y="12653622"/>
+              <a:chExt cx="2510314" cy="2308683"/>
+            </a:xfrm>
+          </p:grpSpPr>
+          <p:sp>
+            <p:nvSpPr>
+              <p:cNvPr id="22" name="Snip Single Corner Rectangle 21"/>
+              <p:cNvSpPr/>
+              <p:nvPr/>
+            </p:nvSpPr>
+            <p:spPr>
+              <a:xfrm>
+                <a:off x="716724" y="12653622"/>
+                <a:ext cx="1981200" cy="1811099"/>
+              </a:xfrm>
+              <a:prstGeom prst="snip1Rect">
+                <a:avLst/>
+              </a:prstGeom>
+              <a:solidFill>
+                <a:schemeClr val="accent6"/>
+              </a:solidFill>
+              <a:ln>
+                <a:solidFill>
+                  <a:schemeClr val="accent3">
+                    <a:lumMod val="50000"/>
+                  </a:schemeClr>
+                </a:solidFill>
+              </a:ln>
+            </p:spPr>
+            <p:style>
+              <a:lnRef idx="2">
+                <a:schemeClr val="accent1">
+                  <a:shade val="50000"/>
+                </a:schemeClr>
+              </a:lnRef>
+              <a:fillRef idx="1">
+                <a:schemeClr val="accent1"/>
+              </a:fillRef>
+              <a:effectRef idx="0">
+                <a:schemeClr val="accent1"/>
+              </a:effectRef>
+              <a:fontRef idx="minor">
+                <a:schemeClr val="lt1"/>
+              </a:fontRef>
+            </p:style>
+            <p:txBody>
+              <a:bodyPr rtlCol="0" anchor="ctr"/>
+              <a:lstStyle/>
+              <a:p>
+                <a:pPr algn="ctr"/>
+                <a:endParaRPr lang="en-US" b="1" dirty="0"/>
+              </a:p>
+            </p:txBody>
+          </p:sp>
+          <p:sp>
+            <p:nvSpPr>
+              <p:cNvPr id="23" name="Snip Single Corner Rectangle 22"/>
+              <p:cNvSpPr/>
+              <p:nvPr/>
+            </p:nvSpPr>
+            <p:spPr>
+              <a:xfrm>
+                <a:off x="981281" y="12902414"/>
+                <a:ext cx="1981200" cy="1811099"/>
+              </a:xfrm>
+              <a:prstGeom prst="snip1Rect">
+                <a:avLst/>
+              </a:prstGeom>
+              <a:solidFill>
+                <a:schemeClr val="accent6"/>
+              </a:solidFill>
+              <a:ln>
+                <a:solidFill>
+                  <a:schemeClr val="accent3">
+                    <a:lumMod val="50000"/>
+                  </a:schemeClr>
+                </a:solidFill>
+              </a:ln>
+            </p:spPr>
+            <p:style>
+              <a:lnRef idx="2">
+                <a:schemeClr val="accent1">
+                  <a:shade val="50000"/>
+                </a:schemeClr>
+              </a:lnRef>
+              <a:fillRef idx="1">
+                <a:schemeClr val="accent1"/>
+              </a:fillRef>
+              <a:effectRef idx="0">
+                <a:schemeClr val="accent1"/>
+              </a:effectRef>
+              <a:fontRef idx="minor">
+                <a:schemeClr val="lt1"/>
+              </a:fontRef>
+            </p:style>
+            <p:txBody>
+              <a:bodyPr rtlCol="0" anchor="ctr"/>
+              <a:lstStyle/>
+              <a:p>
+                <a:pPr algn="ctr"/>
+                <a:endParaRPr lang="en-US" b="1"/>
+              </a:p>
+            </p:txBody>
+          </p:sp>
+          <p:sp>
+            <p:nvSpPr>
+              <p:cNvPr id="24" name="Snip Single Corner Rectangle 23"/>
+              <p:cNvSpPr/>
+              <p:nvPr/>
+            </p:nvSpPr>
+            <p:spPr>
+              <a:xfrm>
+                <a:off x="1245838" y="13151206"/>
+                <a:ext cx="1981200" cy="1811099"/>
+              </a:xfrm>
+              <a:prstGeom prst="snip1Rect">
+                <a:avLst/>
+              </a:prstGeom>
+              <a:solidFill>
+                <a:schemeClr val="accent6"/>
+              </a:solidFill>
+              <a:ln>
+                <a:solidFill>
+                  <a:schemeClr val="accent3">
+                    <a:lumMod val="50000"/>
+                  </a:schemeClr>
+                </a:solidFill>
+              </a:ln>
+            </p:spPr>
+            <p:style>
+              <a:lnRef idx="2">
+                <a:schemeClr val="accent1">
+                  <a:shade val="50000"/>
+                </a:schemeClr>
+              </a:lnRef>
+              <a:fillRef idx="1">
+                <a:schemeClr val="accent1"/>
+              </a:fillRef>
+              <a:effectRef idx="0">
+                <a:schemeClr val="accent1"/>
+              </a:effectRef>
+              <a:fontRef idx="minor">
+                <a:schemeClr val="lt1"/>
+              </a:fontRef>
+            </p:style>
+            <p:txBody>
+              <a:bodyPr rtlCol="0" anchor="ctr"/>
+              <a:lstStyle/>
+              <a:p>
+                <a:pPr algn="ctr"/>
+                <a:r>
+                  <a:rPr lang="en-US" sz="2400" dirty="0" smtClean="0"/>
+                  <a:t>Rail</a:t>
+                </a:r>
+                <a:br>
+                  <a:rPr lang="en-US" sz="2400" dirty="0" smtClean="0"/>
+                </a:br>
+                <a:r>
+                  <a:rPr lang="en-US" sz="2400" dirty="0" smtClean="0"/>
+                  <a:t>Defect</a:t>
+                </a:r>
+                <a:br>
+                  <a:rPr lang="en-US" sz="2400" dirty="0" smtClean="0"/>
+                </a:br>
+                <a:r>
+                  <a:rPr lang="en-US" sz="2400" dirty="0" smtClean="0"/>
+                  <a:t>Data</a:t>
+                </a:r>
+                <a:endParaRPr lang="en-US" sz="2400" dirty="0"/>
+              </a:p>
+            </p:txBody>
+          </p:sp>
+        </p:grpSp>
+        <p:sp>
+          <p:nvSpPr>
+            <p:cNvPr id="21" name="Right Arrow 20"/>
+            <p:cNvSpPr/>
+            <p:nvPr/>
+          </p:nvSpPr>
+          <p:spPr>
+            <a:xfrm>
+              <a:off x="3144103" y="16642080"/>
+              <a:ext cx="662776" cy="462955"/>
+            </a:xfrm>
+            <a:prstGeom prst="rightArrow">
+              <a:avLst/>
+            </a:prstGeom>
+            <a:solidFill>
+              <a:schemeClr val="tx1"/>
+            </a:solidFill>
+            <a:ln>
+              <a:solidFill>
+                <a:schemeClr val="tx1"/>
+              </a:solidFill>
+            </a:ln>
+          </p:spPr>
+          <p:style>
+            <a:lnRef idx="2">
+              <a:schemeClr val="accent1">
+                <a:shade val="50000"/>
+              </a:schemeClr>
+            </a:lnRef>
+            <a:fillRef idx="1">
+              <a:schemeClr val="accent1"/>
+            </a:fillRef>
+            <a:effectRef idx="0">
+              <a:schemeClr val="accent1"/>
+            </a:effectRef>
+            <a:fontRef idx="minor">
+              <a:schemeClr val="lt1"/>
+            </a:fontRef>
+          </p:style>
+          <p:txBody>
+            <a:bodyPr rtlCol="0" anchor="ctr"/>
+            <a:lstStyle/>
+            <a:p>
+              <a:pPr algn="ctr"/>
+              <a:endParaRPr lang="en-US"/>
+            </a:p>
+          </p:txBody>
+        </p:sp>
+      </p:grpSp>
+      <p:sp>
+        <p:nvSpPr>
+          <p:cNvPr id="32" name="Rectangle 31"/>
+          <p:cNvSpPr/>
+          <p:nvPr/>
+        </p:nvSpPr>
+        <p:spPr>
+          <a:xfrm>
+            <a:off x="7218496" y="2335719"/>
+            <a:ext cx="142239" cy="3211801"/>
+          </a:xfrm>
+          <a:prstGeom prst="rect">
+            <a:avLst/>
+          </a:prstGeom>
+          <a:solidFill>
+            <a:schemeClr val="tx1"/>
+          </a:solidFill>
+          <a:ln>
+            <a:solidFill>
+              <a:schemeClr val="tx1"/>
+            </a:solidFill>
+          </a:ln>
+        </p:spPr>
+        <p:style>
+          <a:lnRef idx="2">
+            <a:schemeClr val="accent1">
+              <a:shade val="50000"/>
+            </a:schemeClr>
+          </a:lnRef>
+          <a:fillRef idx="1">
+            <a:schemeClr val="accent1"/>
+          </a:fillRef>
+          <a:effectRef idx="0">
+            <a:schemeClr val="accent1"/>
+          </a:effectRef>
+          <a:fontRef idx="minor">
+            <a:schemeClr val="lt1"/>
+          </a:fontRef>
+        </p:style>
+        <p:txBody>
+          <a:bodyPr rtlCol="0" anchor="ctr"/>
+          <a:lstStyle/>
+          <a:p>
+            <a:pPr algn="ctr"/>
+            <a:endParaRPr lang="en-US"/>
+          </a:p>
+        </p:txBody>
+      </p:sp>
+      <p:sp>
+        <p:nvSpPr>
+          <p:cNvPr id="33" name="Right Arrow 32"/>
+          <p:cNvSpPr/>
+          <p:nvPr/>
+        </p:nvSpPr>
+        <p:spPr>
+          <a:xfrm>
+            <a:off x="7218496" y="2230939"/>
+            <a:ext cx="482343" cy="251788"/>
+          </a:xfrm>
+          <a:prstGeom prst="rightArrow">
+            <a:avLst/>
+          </a:prstGeom>
+          <a:solidFill>
+            <a:schemeClr val="tx1"/>
+          </a:solidFill>
+          <a:ln>
+            <a:solidFill>
+              <a:schemeClr val="tx1"/>
+            </a:solidFill>
+          </a:ln>
+        </p:spPr>
+        <p:style>
+          <a:lnRef idx="2">
+            <a:schemeClr val="accent1">
+              <a:shade val="50000"/>
+            </a:schemeClr>
+          </a:lnRef>
+          <a:fillRef idx="1">
+            <a:schemeClr val="accent1"/>
+          </a:fillRef>
+          <a:effectRef idx="0">
+            <a:schemeClr val="accent1"/>
+          </a:effectRef>
+          <a:fontRef idx="minor">
+            <a:schemeClr val="lt1"/>
+          </a:fontRef>
+        </p:style>
+        <p:txBody>
+          <a:bodyPr rtlCol="0" anchor="ctr"/>
+          <a:lstStyle/>
+          <a:p>
+            <a:pPr algn="ctr"/>
+            <a:endParaRPr lang="en-US"/>
+          </a:p>
+        </p:txBody>
+      </p:sp>
+      <p:sp>
+        <p:nvSpPr>
+          <p:cNvPr id="34" name="Right Arrow 33"/>
+          <p:cNvSpPr/>
+          <p:nvPr/>
+        </p:nvSpPr>
+        <p:spPr>
+          <a:xfrm rot="5400000">
+            <a:off x="9277328" y="3999215"/>
+            <a:ext cx="482343" cy="441812"/>
+          </a:xfrm>
+          <a:prstGeom prst="rightArrow">
+            <a:avLst/>
+          </a:prstGeom>
+          <a:solidFill>
+            <a:schemeClr val="tx1"/>
+          </a:solidFill>
+          <a:ln>
+            <a:solidFill>
+              <a:schemeClr val="tx1"/>
+            </a:solidFill>
+          </a:ln>
+        </p:spPr>
+        <p:style>
+          <a:lnRef idx="2">
+            <a:schemeClr val="accent1">
+              <a:shade val="50000"/>
+            </a:schemeClr>
+          </a:lnRef>
+          <a:fillRef idx="1">
+            <a:schemeClr val="accent1"/>
+          </a:fillRef>
+          <a:effectRef idx="0">
+            <a:schemeClr val="accent1"/>
+          </a:effectRef>
+          <a:fontRef idx="minor">
+            <a:schemeClr val="lt1"/>
+          </a:fontRef>
+        </p:style>
+        <p:txBody>
+          <a:bodyPr rtlCol="0" anchor="ctr"/>
+          <a:lstStyle/>
+          <a:p>
+            <a:pPr algn="ctr"/>
+            <a:endParaRPr lang="en-US"/>
+          </a:p>
+        </p:txBody>
+      </p:sp>
+      <p:sp>
+        <p:nvSpPr>
+          <p:cNvPr id="40" name="Rectangle 39"/>
+          <p:cNvSpPr/>
+          <p:nvPr/>
+        </p:nvSpPr>
+        <p:spPr>
+          <a:xfrm>
+            <a:off x="4636984" y="1466247"/>
+            <a:ext cx="1979926" cy="2060168"/>
+          </a:xfrm>
+          <a:prstGeom prst="rect">
+            <a:avLst/>
+          </a:prstGeom>
+          <a:solidFill>
+            <a:schemeClr val="accent1">
+              <a:alpha val="50000"/>
+            </a:schemeClr>
+          </a:solidFill>
+        </p:spPr>
+        <p:style>
+          <a:lnRef idx="2">
+            <a:schemeClr val="accent1">
+              <a:shade val="50000"/>
+            </a:schemeClr>
+          </a:lnRef>
+          <a:fillRef idx="1">
+            <a:schemeClr val="accent1"/>
+          </a:fillRef>
+          <a:effectRef idx="0">
+            <a:schemeClr val="accent1"/>
+          </a:effectRef>
+          <a:fontRef idx="minor">
+            <a:schemeClr val="lt1"/>
+          </a:fontRef>
+        </p:style>
+        <p:txBody>
+          <a:bodyPr rtlCol="0" anchor="t"/>
+          <a:lstStyle/>
+          <a:p>
+            <a:pPr marL="330200" indent="-330200">
+              <a:buFont typeface="Arial" charset="0"/>
+              <a:buChar char="•"/>
+            </a:pPr>
+            <a:endParaRPr lang="en-US" sz="2400" dirty="0" smtClean="0"/>
+          </a:p>
+        </p:txBody>
+      </p:sp>
+      <p:sp>
+        <p:nvSpPr>
+          <p:cNvPr id="38" name="Rectangle 37"/>
+          <p:cNvSpPr/>
+          <p:nvPr/>
+        </p:nvSpPr>
+        <p:spPr>
+          <a:xfrm>
+            <a:off x="4777050" y="1564987"/>
+            <a:ext cx="1708427" cy="851909"/>
+          </a:xfrm>
+          <a:prstGeom prst="rect">
+            <a:avLst/>
+          </a:prstGeom>
+        </p:spPr>
+        <p:style>
+          <a:lnRef idx="2">
+            <a:schemeClr val="accent1">
+              <a:shade val="50000"/>
+            </a:schemeClr>
+          </a:lnRef>
+          <a:fillRef idx="1">
+            <a:schemeClr val="accent1"/>
+          </a:fillRef>
+          <a:effectRef idx="0">
+            <a:schemeClr val="accent1"/>
+          </a:effectRef>
+          <a:fontRef idx="minor">
+            <a:schemeClr val="lt1"/>
+          </a:fontRef>
+        </p:style>
+        <p:txBody>
+          <a:bodyPr rtlCol="0" anchor="t"/>
+          <a:lstStyle/>
+          <a:p>
+            <a:pPr algn="ctr"/>
+            <a:r>
+              <a:rPr lang="en-US" sz="2400" dirty="0" smtClean="0"/>
+              <a:t>Class Label </a:t>
+            </a:r>
+            <a:br>
+              <a:rPr lang="en-US" sz="2400" dirty="0" smtClean="0"/>
+            </a:br>
+            <a:r>
+              <a:rPr lang="en-US" sz="2400" dirty="0" smtClean="0"/>
+              <a:t>Merging</a:t>
+            </a:r>
+          </a:p>
+          <a:p>
+            <a:pPr marL="330200" indent="-330200">
+              <a:buFont typeface="Arial" charset="0"/>
+              <a:buChar char="•"/>
+            </a:pPr>
+            <a:endParaRPr lang="en-US" sz="2400" dirty="0" smtClean="0"/>
+          </a:p>
+        </p:txBody>
+      </p:sp>
+      <p:sp>
+        <p:nvSpPr>
+          <p:cNvPr id="39" name="Rectangle 38"/>
+          <p:cNvSpPr/>
+          <p:nvPr/>
+        </p:nvSpPr>
+        <p:spPr>
+          <a:xfrm>
+            <a:off x="4777050" y="2538318"/>
+            <a:ext cx="1708428" cy="905888"/>
+          </a:xfrm>
+          <a:prstGeom prst="rect">
+            <a:avLst/>
+          </a:prstGeom>
+        </p:spPr>
+        <p:style>
+          <a:lnRef idx="2">
+            <a:schemeClr val="accent1">
+              <a:shade val="50000"/>
+            </a:schemeClr>
+          </a:lnRef>
+          <a:fillRef idx="1">
+            <a:schemeClr val="accent1"/>
+          </a:fillRef>
+          <a:effectRef idx="0">
+            <a:schemeClr val="accent1"/>
+          </a:effectRef>
+          <a:fontRef idx="minor">
+            <a:schemeClr val="lt1"/>
+          </a:fontRef>
+        </p:style>
+        <p:txBody>
+          <a:bodyPr rtlCol="0" anchor="t"/>
+          <a:lstStyle/>
+          <a:p>
+            <a:pPr algn="ctr"/>
+            <a:r>
+              <a:rPr lang="en-US" sz="2400" dirty="0" smtClean="0"/>
+              <a:t>Geographic</a:t>
+            </a:r>
+            <a:br>
+              <a:rPr lang="en-US" sz="2400" dirty="0" smtClean="0"/>
+            </a:br>
+            <a:r>
+              <a:rPr lang="en-US" sz="2400" dirty="0" smtClean="0"/>
+              <a:t>Filtering</a:t>
+            </a:r>
+          </a:p>
+          <a:p>
+            <a:pPr marL="330200" indent="-330200">
+              <a:buFont typeface="Arial" charset="0"/>
+              <a:buChar char="•"/>
+            </a:pPr>
+            <a:endParaRPr lang="en-US" sz="2400" dirty="0" smtClean="0"/>
+          </a:p>
+        </p:txBody>
+      </p:sp>
     </p:spTree>
     <p:extLst>
       <p:ext uri="{BB962C8B-B14F-4D97-AF65-F5344CB8AC3E}">

</xml_diff>